<commit_message>
[cpp] adding cv3 slides
</commit_message>
<xml_diff>
--- a/data/cpp/cv3/cpp_cv3.pptx
+++ b/data/cpp/cv3/cpp_cv3.pptx
@@ -5,7 +5,7 @@
     <p:sldMasterId id="2147483648" r:id="rId1"/>
   </p:sldMasterIdLst>
   <p:notesMasterIdLst>
-    <p:notesMasterId r:id="rId10"/>
+    <p:notesMasterId r:id="rId11"/>
   </p:notesMasterIdLst>
   <p:sldIdLst>
     <p:sldId id="256" r:id="rId2"/>
@@ -14,8 +14,9 @@
     <p:sldId id="262" r:id="rId5"/>
     <p:sldId id="258" r:id="rId6"/>
     <p:sldId id="259" r:id="rId7"/>
-    <p:sldId id="263" r:id="rId8"/>
-    <p:sldId id="257" r:id="rId9"/>
+    <p:sldId id="264" r:id="rId8"/>
+    <p:sldId id="263" r:id="rId9"/>
+    <p:sldId id="257" r:id="rId10"/>
   </p:sldIdLst>
   <p:sldSz cx="12192000" cy="6858000"/>
   <p:notesSz cx="6858000" cy="9144000"/>
@@ -114,6 +115,11 @@
       </a:defRPr>
     </a:lvl9pPr>
   </p:defaultTextStyle>
+  <p:extLst>
+    <p:ext uri="{EFAFB233-063F-42B5-8137-9DF3F51BA10A}">
+      <p15:sldGuideLst xmlns:p15="http://schemas.microsoft.com/office/powerpoint/2012/main"/>
+    </p:ext>
+  </p:extLst>
 </p:presentation>
 </file>
 
@@ -9720,6 +9726,102 @@
           <a:p>
             <a:r>
               <a:rPr lang="cs-CZ" dirty="0" smtClean="0"/>
+              <a:t>enum</a:t>
+            </a:r>
+            <a:endParaRPr lang="en-US" dirty="0"/>
+          </a:p>
+        </p:txBody>
+      </p:sp>
+      <p:sp>
+        <p:nvSpPr>
+          <p:cNvPr id="3" name="Content Placeholder 2"/>
+          <p:cNvSpPr>
+            <a:spLocks noGrp="1"/>
+          </p:cNvSpPr>
+          <p:nvPr>
+            <p:ph idx="1"/>
+          </p:nvPr>
+        </p:nvSpPr>
+        <p:spPr/>
+        <p:txBody>
+          <a:bodyPr/>
+          <a:lstStyle/>
+          <a:p>
+            <a:pPr marL="0" indent="0">
+              <a:buNone/>
+            </a:pPr>
+            <a:r>
+              <a:rPr lang="en-US" dirty="0" err="1" smtClean="0"/>
+              <a:t>enum</a:t>
+            </a:r>
+            <a:r>
+              <a:rPr lang="en-US" dirty="0" smtClean="0"/>
+              <a:t> class Colors {</a:t>
+            </a:r>
+            <a:br>
+              <a:rPr lang="en-US" dirty="0" smtClean="0"/>
+            </a:br>
+            <a:r>
+              <a:rPr lang="en-US" dirty="0" smtClean="0"/>
+              <a:t>  BLUE, RED, YELLOW, GREEN</a:t>
+            </a:r>
+            <a:br>
+              <a:rPr lang="en-US" dirty="0" smtClean="0"/>
+            </a:br>
+            <a:r>
+              <a:rPr lang="en-US" dirty="0" smtClean="0"/>
+              <a:t>}</a:t>
+            </a:r>
+          </a:p>
+        </p:txBody>
+      </p:sp>
+    </p:spTree>
+    <p:extLst>
+      <p:ext uri="{BB962C8B-B14F-4D97-AF65-F5344CB8AC3E}">
+        <p14:creationId xmlns:p14="http://schemas.microsoft.com/office/powerpoint/2010/main" val="1463734587"/>
+      </p:ext>
+    </p:extLst>
+  </p:cSld>
+  <p:clrMapOvr>
+    <a:masterClrMapping/>
+  </p:clrMapOvr>
+</p:sld>
+</file>
+
+<file path=ppt/slides/slide8.xml><?xml version="1.0" encoding="utf-8"?>
+<p:sld xmlns:a="http://schemas.openxmlformats.org/drawingml/2006/main" xmlns:r="http://schemas.openxmlformats.org/officeDocument/2006/relationships" xmlns:p="http://schemas.openxmlformats.org/presentationml/2006/main">
+  <p:cSld>
+    <p:spTree>
+      <p:nvGrpSpPr>
+        <p:cNvPr id="1" name=""/>
+        <p:cNvGrpSpPr/>
+        <p:nvPr/>
+      </p:nvGrpSpPr>
+      <p:grpSpPr>
+        <a:xfrm>
+          <a:off x="0" y="0"/>
+          <a:ext cx="0" cy="0"/>
+          <a:chOff x="0" y="0"/>
+          <a:chExt cx="0" cy="0"/>
+        </a:xfrm>
+      </p:grpSpPr>
+      <p:sp>
+        <p:nvSpPr>
+          <p:cNvPr id="2" name="Title 1"/>
+          <p:cNvSpPr>
+            <a:spLocks noGrp="1"/>
+          </p:cNvSpPr>
+          <p:nvPr>
+            <p:ph type="title"/>
+          </p:nvPr>
+        </p:nvSpPr>
+        <p:spPr/>
+        <p:txBody>
+          <a:bodyPr/>
+          <a:lstStyle/>
+          <a:p>
+            <a:r>
+              <a:rPr lang="cs-CZ" dirty="0" smtClean="0"/>
               <a:t>Úkoly</a:t>
             </a:r>
             <a:endParaRPr lang="en-US" dirty="0"/>
@@ -9747,12 +9849,83 @@
             </a:pPr>
             <a:r>
               <a:rPr lang="cs-CZ" dirty="0" smtClean="0"/>
-              <a:t>Úkol 3 </a:t>
-            </a:r>
-            <a:r>
-              <a:rPr lang="cs-CZ" smtClean="0"/>
-              <a:t>z minula</a:t>
-            </a:r>
+              <a:t>Úkol 3 z </a:t>
+            </a:r>
+            <a:r>
+              <a:rPr lang="cs-CZ" dirty="0" smtClean="0"/>
+              <a:t>minula </a:t>
+            </a:r>
+            <a:r>
+              <a:rPr lang="en-US" dirty="0" smtClean="0"/>
+              <a:t>+ t</a:t>
+            </a:r>
+            <a:r>
+              <a:rPr lang="cs-CZ" dirty="0" smtClean="0"/>
+              <a:t>řída Complex</a:t>
+            </a:r>
+          </a:p>
+          <a:p>
+            <a:pPr lvl="1"/>
+            <a:r>
+              <a:rPr lang="en-US" b="1" dirty="0" err="1"/>
+              <a:t>poslat</a:t>
+            </a:r>
+            <a:r>
+              <a:rPr lang="en-US" b="1" dirty="0"/>
+              <a:t> </a:t>
+            </a:r>
+            <a:r>
+              <a:rPr lang="en-US" b="1" dirty="0" err="1"/>
+              <a:t>mailem</a:t>
+            </a:r>
+            <a:r>
+              <a:rPr lang="en-US" b="1" dirty="0"/>
+              <a:t> do </a:t>
+            </a:r>
+            <a:r>
+              <a:rPr lang="cs-CZ" b="1" dirty="0"/>
+              <a:t>dnešní </a:t>
+            </a:r>
+            <a:r>
+              <a:rPr lang="en-US" b="1" dirty="0"/>
+              <a:t>p</a:t>
+            </a:r>
+            <a:r>
+              <a:rPr lang="cs-CZ" b="1" dirty="0" smtClean="0"/>
+              <a:t>ůlnoci</a:t>
+            </a:r>
+            <a:endParaRPr lang="cs-CZ" dirty="0"/>
+          </a:p>
+          <a:p>
+            <a:pPr>
+              <a:buFont typeface="+mj-lt"/>
+              <a:buAutoNum type="arabicPeriod"/>
+            </a:pPr>
+            <a:r>
+              <a:rPr lang="cs-CZ" dirty="0" smtClean="0"/>
+              <a:t>Piškvorky pro 2 hráče</a:t>
+            </a:r>
+          </a:p>
+          <a:p>
+            <a:pPr lvl="1"/>
+            <a:r>
+              <a:rPr lang="cs-CZ" dirty="0" smtClean="0"/>
+              <a:t>Třídy, OOP, vector&lt;T&gt;</a:t>
+            </a:r>
+          </a:p>
+          <a:p>
+            <a:pPr lvl="1">
+              <a:buFont typeface="+mj-lt"/>
+              <a:buAutoNum type="arabicPeriod"/>
+            </a:pPr>
+            <a:endParaRPr lang="cs-CZ" dirty="0" smtClean="0"/>
+          </a:p>
+          <a:p>
+            <a:pPr>
+              <a:buFont typeface="+mj-lt"/>
+              <a:buAutoNum type="arabicPeriod"/>
+            </a:pPr>
+            <a:endParaRPr lang="cs-CZ" dirty="0" smtClean="0"/>
           </a:p>
           <a:p>
             <a:pPr>
@@ -9786,7 +9959,7 @@
 </p:sld>
 </file>
 
-<file path=ppt/slides/slide8.xml><?xml version="1.0" encoding="utf-8"?>
+<file path=ppt/slides/slide9.xml><?xml version="1.0" encoding="utf-8"?>
 <p:sld xmlns:a="http://schemas.openxmlformats.org/drawingml/2006/main" xmlns:r="http://schemas.openxmlformats.org/officeDocument/2006/relationships" xmlns:p="http://schemas.openxmlformats.org/presentationml/2006/main">
   <p:cSld>
     <p:spTree>

</xml_diff>

<commit_message>
[cpp] update cv3 slides
</commit_message>
<xml_diff>
--- a/data/cpp/cv3/cpp_cv3.pptx
+++ b/data/cpp/cv3/cpp_cv3.pptx
@@ -5,7 +5,7 @@
     <p:sldMasterId id="2147483648" r:id="rId1"/>
   </p:sldMasterIdLst>
   <p:notesMasterIdLst>
-    <p:notesMasterId r:id="rId11"/>
+    <p:notesMasterId r:id="rId10"/>
   </p:notesMasterIdLst>
   <p:sldIdLst>
     <p:sldId id="256" r:id="rId2"/>
@@ -14,9 +14,8 @@
     <p:sldId id="262" r:id="rId5"/>
     <p:sldId id="258" r:id="rId6"/>
     <p:sldId id="259" r:id="rId7"/>
-    <p:sldId id="264" r:id="rId8"/>
-    <p:sldId id="263" r:id="rId9"/>
-    <p:sldId id="257" r:id="rId10"/>
+    <p:sldId id="263" r:id="rId8"/>
+    <p:sldId id="257" r:id="rId9"/>
   </p:sldIdLst>
   <p:sldSz cx="12192000" cy="6858000"/>
   <p:notesSz cx="6858000" cy="9144000"/>
@@ -9726,102 +9725,6 @@
           <a:p>
             <a:r>
               <a:rPr lang="cs-CZ" dirty="0" smtClean="0"/>
-              <a:t>enum</a:t>
-            </a:r>
-            <a:endParaRPr lang="en-US" dirty="0"/>
-          </a:p>
-        </p:txBody>
-      </p:sp>
-      <p:sp>
-        <p:nvSpPr>
-          <p:cNvPr id="3" name="Content Placeholder 2"/>
-          <p:cNvSpPr>
-            <a:spLocks noGrp="1"/>
-          </p:cNvSpPr>
-          <p:nvPr>
-            <p:ph idx="1"/>
-          </p:nvPr>
-        </p:nvSpPr>
-        <p:spPr/>
-        <p:txBody>
-          <a:bodyPr/>
-          <a:lstStyle/>
-          <a:p>
-            <a:pPr marL="0" indent="0">
-              <a:buNone/>
-            </a:pPr>
-            <a:r>
-              <a:rPr lang="en-US" dirty="0" err="1" smtClean="0"/>
-              <a:t>enum</a:t>
-            </a:r>
-            <a:r>
-              <a:rPr lang="en-US" dirty="0" smtClean="0"/>
-              <a:t> class Colors {</a:t>
-            </a:r>
-            <a:br>
-              <a:rPr lang="en-US" dirty="0" smtClean="0"/>
-            </a:br>
-            <a:r>
-              <a:rPr lang="en-US" dirty="0" smtClean="0"/>
-              <a:t>  BLUE, RED, YELLOW, GREEN</a:t>
-            </a:r>
-            <a:br>
-              <a:rPr lang="en-US" dirty="0" smtClean="0"/>
-            </a:br>
-            <a:r>
-              <a:rPr lang="en-US" dirty="0" smtClean="0"/>
-              <a:t>}</a:t>
-            </a:r>
-          </a:p>
-        </p:txBody>
-      </p:sp>
-    </p:spTree>
-    <p:extLst>
-      <p:ext uri="{BB962C8B-B14F-4D97-AF65-F5344CB8AC3E}">
-        <p14:creationId xmlns:p14="http://schemas.microsoft.com/office/powerpoint/2010/main" val="1463734587"/>
-      </p:ext>
-    </p:extLst>
-  </p:cSld>
-  <p:clrMapOvr>
-    <a:masterClrMapping/>
-  </p:clrMapOvr>
-</p:sld>
-</file>
-
-<file path=ppt/slides/slide8.xml><?xml version="1.0" encoding="utf-8"?>
-<p:sld xmlns:a="http://schemas.openxmlformats.org/drawingml/2006/main" xmlns:r="http://schemas.openxmlformats.org/officeDocument/2006/relationships" xmlns:p="http://schemas.openxmlformats.org/presentationml/2006/main">
-  <p:cSld>
-    <p:spTree>
-      <p:nvGrpSpPr>
-        <p:cNvPr id="1" name=""/>
-        <p:cNvGrpSpPr/>
-        <p:nvPr/>
-      </p:nvGrpSpPr>
-      <p:grpSpPr>
-        <a:xfrm>
-          <a:off x="0" y="0"/>
-          <a:ext cx="0" cy="0"/>
-          <a:chOff x="0" y="0"/>
-          <a:chExt cx="0" cy="0"/>
-        </a:xfrm>
-      </p:grpSpPr>
-      <p:sp>
-        <p:nvSpPr>
-          <p:cNvPr id="2" name="Title 1"/>
-          <p:cNvSpPr>
-            <a:spLocks noGrp="1"/>
-          </p:cNvSpPr>
-          <p:nvPr>
-            <p:ph type="title"/>
-          </p:nvPr>
-        </p:nvSpPr>
-        <p:spPr/>
-        <p:txBody>
-          <a:bodyPr/>
-          <a:lstStyle/>
-          <a:p>
-            <a:r>
-              <a:rPr lang="cs-CZ" dirty="0" smtClean="0"/>
               <a:t>Úkoly</a:t>
             </a:r>
             <a:endParaRPr lang="en-US" dirty="0"/>
@@ -9905,6 +9808,7 @@
               <a:rPr lang="cs-CZ" dirty="0" smtClean="0"/>
               <a:t>Piškvorky pro 2 hráče</a:t>
             </a:r>
+            <a:endParaRPr lang="en-US" dirty="0" smtClean="0"/>
           </a:p>
           <a:p>
             <a:pPr lvl="1"/>
@@ -9959,7 +9863,7 @@
 </p:sld>
 </file>
 
-<file path=ppt/slides/slide9.xml><?xml version="1.0" encoding="utf-8"?>
+<file path=ppt/slides/slide8.xml><?xml version="1.0" encoding="utf-8"?>
 <p:sld xmlns:a="http://schemas.openxmlformats.org/drawingml/2006/main" xmlns:r="http://schemas.openxmlformats.org/officeDocument/2006/relationships" xmlns:p="http://schemas.openxmlformats.org/presentationml/2006/main">
   <p:cSld>
     <p:spTree>

</xml_diff>